<commit_message>
update allocation, instruction image (spacebar)
</commit_message>
<xml_diff>
--- a/Instructions_Pictures/Dichotic/D1Binstructions (1).pptx
+++ b/Instructions_Pictures/Dichotic/D1Binstructions (1).pptx
@@ -249,7 +249,7 @@
           <a:p>
             <a:fld id="{4476BBAF-3BF1-4078-A5DF-44D473DCBE61}" type="datetimeFigureOut">
               <a:rPr lang="he-IL" smtClean="0"/>
-              <a:t>ב'/חשון/תשע"ט</a:t>
+              <a:t>כ"ח/תמוז/תש"ף</a:t>
             </a:fld>
             <a:endParaRPr lang="he-IL"/>
           </a:p>
@@ -419,7 +419,7 @@
           <a:p>
             <a:fld id="{4476BBAF-3BF1-4078-A5DF-44D473DCBE61}" type="datetimeFigureOut">
               <a:rPr lang="he-IL" smtClean="0"/>
-              <a:t>ב'/חשון/תשע"ט</a:t>
+              <a:t>כ"ח/תמוז/תש"ף</a:t>
             </a:fld>
             <a:endParaRPr lang="he-IL"/>
           </a:p>
@@ -599,7 +599,7 @@
           <a:p>
             <a:fld id="{4476BBAF-3BF1-4078-A5DF-44D473DCBE61}" type="datetimeFigureOut">
               <a:rPr lang="he-IL" smtClean="0"/>
-              <a:t>ב'/חשון/תשע"ט</a:t>
+              <a:t>כ"ח/תמוז/תש"ף</a:t>
             </a:fld>
             <a:endParaRPr lang="he-IL"/>
           </a:p>
@@ -769,7 +769,7 @@
           <a:p>
             <a:fld id="{4476BBAF-3BF1-4078-A5DF-44D473DCBE61}" type="datetimeFigureOut">
               <a:rPr lang="he-IL" smtClean="0"/>
-              <a:t>ב'/חשון/תשע"ט</a:t>
+              <a:t>כ"ח/תמוז/תש"ף</a:t>
             </a:fld>
             <a:endParaRPr lang="he-IL"/>
           </a:p>
@@ -1015,7 +1015,7 @@
           <a:p>
             <a:fld id="{4476BBAF-3BF1-4078-A5DF-44D473DCBE61}" type="datetimeFigureOut">
               <a:rPr lang="he-IL" smtClean="0"/>
-              <a:t>ב'/חשון/תשע"ט</a:t>
+              <a:t>כ"ח/תמוז/תש"ף</a:t>
             </a:fld>
             <a:endParaRPr lang="he-IL"/>
           </a:p>
@@ -1247,7 +1247,7 @@
           <a:p>
             <a:fld id="{4476BBAF-3BF1-4078-A5DF-44D473DCBE61}" type="datetimeFigureOut">
               <a:rPr lang="he-IL" smtClean="0"/>
-              <a:t>ב'/חשון/תשע"ט</a:t>
+              <a:t>כ"ח/תמוז/תש"ף</a:t>
             </a:fld>
             <a:endParaRPr lang="he-IL"/>
           </a:p>
@@ -1614,7 +1614,7 @@
           <a:p>
             <a:fld id="{4476BBAF-3BF1-4078-A5DF-44D473DCBE61}" type="datetimeFigureOut">
               <a:rPr lang="he-IL" smtClean="0"/>
-              <a:t>ב'/חשון/תשע"ט</a:t>
+              <a:t>כ"ח/תמוז/תש"ף</a:t>
             </a:fld>
             <a:endParaRPr lang="he-IL"/>
           </a:p>
@@ -1732,7 +1732,7 @@
           <a:p>
             <a:fld id="{4476BBAF-3BF1-4078-A5DF-44D473DCBE61}" type="datetimeFigureOut">
               <a:rPr lang="he-IL" smtClean="0"/>
-              <a:t>ב'/חשון/תשע"ט</a:t>
+              <a:t>כ"ח/תמוז/תש"ף</a:t>
             </a:fld>
             <a:endParaRPr lang="he-IL"/>
           </a:p>
@@ -1827,7 +1827,7 @@
           <a:p>
             <a:fld id="{4476BBAF-3BF1-4078-A5DF-44D473DCBE61}" type="datetimeFigureOut">
               <a:rPr lang="he-IL" smtClean="0"/>
-              <a:t>ב'/חשון/תשע"ט</a:t>
+              <a:t>כ"ח/תמוז/תש"ף</a:t>
             </a:fld>
             <a:endParaRPr lang="he-IL"/>
           </a:p>
@@ -2104,7 +2104,7 @@
           <a:p>
             <a:fld id="{4476BBAF-3BF1-4078-A5DF-44D473DCBE61}" type="datetimeFigureOut">
               <a:rPr lang="he-IL" smtClean="0"/>
-              <a:t>ב'/חשון/תשע"ט</a:t>
+              <a:t>כ"ח/תמוז/תש"ף</a:t>
             </a:fld>
             <a:endParaRPr lang="he-IL"/>
           </a:p>
@@ -2357,7 +2357,7 @@
           <a:p>
             <a:fld id="{4476BBAF-3BF1-4078-A5DF-44D473DCBE61}" type="datetimeFigureOut">
               <a:rPr lang="he-IL" smtClean="0"/>
-              <a:t>ב'/חשון/תשע"ט</a:t>
+              <a:t>כ"ח/תמוז/תש"ף</a:t>
             </a:fld>
             <a:endParaRPr lang="he-IL"/>
           </a:p>
@@ -2570,7 +2570,7 @@
           <a:p>
             <a:fld id="{4476BBAF-3BF1-4078-A5DF-44D473DCBE61}" type="datetimeFigureOut">
               <a:rPr lang="he-IL" smtClean="0"/>
-              <a:t>ב'/חשון/תשע"ט</a:t>
+              <a:t>כ"ח/תמוז/תש"ף</a:t>
             </a:fld>
             <a:endParaRPr lang="he-IL"/>
           </a:p>
@@ -3056,17 +3056,7 @@
                 <a:latin typeface="David" panose="020E0502060401010101" pitchFamily="34" charset="-79"/>
                 <a:cs typeface="David" panose="020E0502060401010101" pitchFamily="34" charset="-79"/>
               </a:rPr>
-              <a:t>תבצע/י מטלה </a:t>
-            </a:r>
-            <a:r>
-              <a:rPr lang="he-IL" sz="1553" dirty="0" smtClean="0">
-                <a:solidFill>
-                  <a:schemeClr val="tx1"/>
-                </a:solidFill>
-                <a:latin typeface="David" panose="020E0502060401010101" pitchFamily="34" charset="-79"/>
-                <a:cs typeface="David" panose="020E0502060401010101" pitchFamily="34" charset="-79"/>
-              </a:rPr>
-              <a:t>נוספת.</a:t>
+              <a:t>תבצע/י מטלה נוספת.</a:t>
             </a:r>
           </a:p>
           <a:p>
@@ -3083,7 +3073,17 @@
                 <a:latin typeface="David" panose="020E0502060401010101" pitchFamily="34" charset="-79"/>
                 <a:cs typeface="David" panose="020E0502060401010101" pitchFamily="34" charset="-79"/>
               </a:rPr>
-              <a:t>במטלה זו </a:t>
+              <a:t>במטלה זו תשמע/י במקביל (באותו הזמן) רצף משפטים בכל אוזן. כלומר, באוזן ימין תשמע/י רצף משפטים ובאותו זמן באוזן </a:t>
+            </a:r>
+            <a:r>
+              <a:rPr lang="he-IL" sz="1553" dirty="0">
+                <a:solidFill>
+                  <a:schemeClr val="tx1"/>
+                </a:solidFill>
+                <a:latin typeface="David" panose="020E0502060401010101" pitchFamily="34" charset="-79"/>
+                <a:cs typeface="David" panose="020E0502060401010101" pitchFamily="34" charset="-79"/>
+              </a:rPr>
+              <a:t>שמאל </a:t>
             </a:r>
             <a:r>
               <a:rPr lang="he-IL" sz="1553" dirty="0" smtClean="0">
@@ -3093,7 +3093,17 @@
                 <a:latin typeface="David" panose="020E0502060401010101" pitchFamily="34" charset="-79"/>
                 <a:cs typeface="David" panose="020E0502060401010101" pitchFamily="34" charset="-79"/>
               </a:rPr>
-              <a:t>תשמע/י במקביל (באותו הזמן) </a:t>
+              <a:t>תשמע/י רצף שונה של משפטים. את/ה מתבקש/ת </a:t>
+            </a:r>
+            <a:r>
+              <a:rPr lang="he-IL" sz="1553" b="1" dirty="0" smtClean="0">
+                <a:solidFill>
+                  <a:schemeClr val="tx1"/>
+                </a:solidFill>
+                <a:latin typeface="David" panose="020E0502060401010101" pitchFamily="34" charset="-79"/>
+                <a:cs typeface="David" panose="020E0502060401010101" pitchFamily="34" charset="-79"/>
+              </a:rPr>
+              <a:t>לזהות כאשר את/ה שומע/ת באותו צד את אותו המשפט פעמיים ברצף</a:t>
             </a:r>
             <a:r>
               <a:rPr lang="he-IL" sz="1553" dirty="0" smtClean="0">
@@ -3103,7 +3113,7 @@
                 <a:latin typeface="David" panose="020E0502060401010101" pitchFamily="34" charset="-79"/>
                 <a:cs typeface="David" panose="020E0502060401010101" pitchFamily="34" charset="-79"/>
               </a:rPr>
-              <a:t>רצף משפטים בכל אוזן. כלומר, באוזן ימין תשמע/י רצף משפטים ובאותו </a:t>
+              <a:t>. </a:t>
             </a:r>
             <a:r>
               <a:rPr lang="he-IL" sz="1553" dirty="0" smtClean="0">
@@ -3113,17 +3123,7 @@
                 <a:latin typeface="David" panose="020E0502060401010101" pitchFamily="34" charset="-79"/>
                 <a:cs typeface="David" panose="020E0502060401010101" pitchFamily="34" charset="-79"/>
               </a:rPr>
-              <a:t>זמן באוזן </a:t>
-            </a:r>
-            <a:r>
-              <a:rPr lang="he-IL" sz="1553" dirty="0">
-                <a:solidFill>
-                  <a:schemeClr val="tx1"/>
-                </a:solidFill>
-                <a:latin typeface="David" panose="020E0502060401010101" pitchFamily="34" charset="-79"/>
-                <a:cs typeface="David" panose="020E0502060401010101" pitchFamily="34" charset="-79"/>
-              </a:rPr>
-              <a:t>שמאל </a:t>
+              <a:t>כאשר </a:t>
             </a:r>
             <a:r>
               <a:rPr lang="he-IL" sz="1553" dirty="0" smtClean="0">
@@ -3133,17 +3133,7 @@
                 <a:latin typeface="David" panose="020E0502060401010101" pitchFamily="34" charset="-79"/>
                 <a:cs typeface="David" panose="020E0502060401010101" pitchFamily="34" charset="-79"/>
               </a:rPr>
-              <a:t>תשמע/י רצף שונה </a:t>
-            </a:r>
-            <a:r>
-              <a:rPr lang="he-IL" sz="1553" dirty="0" smtClean="0">
-                <a:solidFill>
-                  <a:schemeClr val="tx1"/>
-                </a:solidFill>
-                <a:latin typeface="David" panose="020E0502060401010101" pitchFamily="34" charset="-79"/>
-                <a:cs typeface="David" panose="020E0502060401010101" pitchFamily="34" charset="-79"/>
-              </a:rPr>
-              <a:t>של משפטים. את/ה מתבקש/ת </a:t>
+              <a:t>זיהית חזרה על אותו משפט, </a:t>
             </a:r>
             <a:r>
               <a:rPr lang="he-IL" sz="1553" b="1" dirty="0" smtClean="0">
@@ -3153,7 +3143,7 @@
                 <a:latin typeface="David" panose="020E0502060401010101" pitchFamily="34" charset="-79"/>
                 <a:cs typeface="David" panose="020E0502060401010101" pitchFamily="34" charset="-79"/>
               </a:rPr>
-              <a:t>לזהות כאשר את/ה שומע/ת באותו צד את אותו המשפט פעמיים </a:t>
+              <a:t>לחץ/י על </a:t>
             </a:r>
             <a:r>
               <a:rPr lang="he-IL" sz="1553" b="1" dirty="0" smtClean="0">
@@ -3163,27 +3153,7 @@
                 <a:latin typeface="David" panose="020E0502060401010101" pitchFamily="34" charset="-79"/>
                 <a:cs typeface="David" panose="020E0502060401010101" pitchFamily="34" charset="-79"/>
               </a:rPr>
-              <a:t>ברצף</a:t>
-            </a:r>
-            <a:r>
-              <a:rPr lang="he-IL" sz="1553" dirty="0" smtClean="0">
-                <a:solidFill>
-                  <a:schemeClr val="tx1"/>
-                </a:solidFill>
-                <a:latin typeface="David" panose="020E0502060401010101" pitchFamily="34" charset="-79"/>
-                <a:cs typeface="David" panose="020E0502060401010101" pitchFamily="34" charset="-79"/>
-              </a:rPr>
-              <a:t>. כלומר, את/ה צריך להאזין לשני הצדדים בו-זמנית. כאשר </a:t>
-            </a:r>
-            <a:r>
-              <a:rPr lang="he-IL" sz="1553" dirty="0" smtClean="0">
-                <a:solidFill>
-                  <a:schemeClr val="tx1"/>
-                </a:solidFill>
-                <a:latin typeface="David" panose="020E0502060401010101" pitchFamily="34" charset="-79"/>
-                <a:cs typeface="David" panose="020E0502060401010101" pitchFamily="34" charset="-79"/>
-              </a:rPr>
-              <a:t>זיהית חזרה על אותו משפט, </a:t>
+              <a:t>חץ</a:t>
             </a:r>
             <a:r>
               <a:rPr lang="he-IL" sz="1553" b="1" dirty="0" smtClean="0">
@@ -3193,7 +3163,7 @@
                 <a:latin typeface="David" panose="020E0502060401010101" pitchFamily="34" charset="-79"/>
                 <a:cs typeface="David" panose="020E0502060401010101" pitchFamily="34" charset="-79"/>
               </a:rPr>
-              <a:t>לחץ/י על כפתור ימין או שמאל בהתאם לצד בו שמעת את המשפט שחזר על </a:t>
+              <a:t> </a:t>
             </a:r>
             <a:r>
               <a:rPr lang="he-IL" sz="1553" b="1" dirty="0" smtClean="0">
@@ -3203,7 +3173,7 @@
                 <a:latin typeface="David" panose="020E0502060401010101" pitchFamily="34" charset="-79"/>
                 <a:cs typeface="David" panose="020E0502060401010101" pitchFamily="34" charset="-79"/>
               </a:rPr>
-              <a:t>עצמו (באותו צד) </a:t>
+              <a:t>ימין או שמאל </a:t>
             </a:r>
             <a:r>
               <a:rPr lang="he-IL" sz="1553" b="1" dirty="0" smtClean="0">
@@ -3213,7 +3183,37 @@
                 <a:latin typeface="David" panose="020E0502060401010101" pitchFamily="34" charset="-79"/>
                 <a:cs typeface="David" panose="020E0502060401010101" pitchFamily="34" charset="-79"/>
               </a:rPr>
-              <a:t>פעמיים ברצף</a:t>
+              <a:t>בפינה הימנית התחתונה במקלדת</a:t>
+            </a:r>
+            <a:r>
+              <a:rPr lang="he-IL" sz="1553" b="1" dirty="0">
+                <a:solidFill>
+                  <a:schemeClr val="tx1"/>
+                </a:solidFill>
+                <a:latin typeface="David" panose="020E0502060401010101" pitchFamily="34" charset="-79"/>
+                <a:cs typeface="David" panose="020E0502060401010101" pitchFamily="34" charset="-79"/>
+              </a:rPr>
+              <a:t>,</a:t>
+            </a:r>
+            <a:r>
+              <a:rPr lang="he-IL" sz="1553" b="1" dirty="0" smtClean="0">
+                <a:solidFill>
+                  <a:schemeClr val="tx1"/>
+                </a:solidFill>
+                <a:latin typeface="David" panose="020E0502060401010101" pitchFamily="34" charset="-79"/>
+                <a:cs typeface="David" panose="020E0502060401010101" pitchFamily="34" charset="-79"/>
+              </a:rPr>
+              <a:t> בהתאם </a:t>
+            </a:r>
+            <a:r>
+              <a:rPr lang="he-IL" sz="1553" b="1" dirty="0" smtClean="0">
+                <a:solidFill>
+                  <a:schemeClr val="tx1"/>
+                </a:solidFill>
+                <a:latin typeface="David" panose="020E0502060401010101" pitchFamily="34" charset="-79"/>
+                <a:cs typeface="David" panose="020E0502060401010101" pitchFamily="34" charset="-79"/>
+              </a:rPr>
+              <a:t>לצד בו שמעת את המשפט שחזר על עצמו (באותו צד) פעמיים ברצף</a:t>
             </a:r>
             <a:r>
               <a:rPr lang="he-IL" sz="1553" dirty="0" smtClean="0">
@@ -3421,7 +3421,17 @@
                 <a:latin typeface="David" panose="020E0502060401010101" pitchFamily="34" charset="-79"/>
                 <a:cs typeface="David" panose="020E0502060401010101" pitchFamily="34" charset="-79"/>
               </a:rPr>
-              <a:t>על אחד הכפתורים</a:t>
+              <a:t>על </a:t>
+            </a:r>
+            <a:r>
+              <a:rPr lang="he-IL" sz="1937" u="sng" dirty="0">
+                <a:solidFill>
+                  <a:schemeClr val="tx1"/>
+                </a:solidFill>
+                <a:latin typeface="David" panose="020E0502060401010101" pitchFamily="34" charset="-79"/>
+                <a:cs typeface="David" panose="020E0502060401010101" pitchFamily="34" charset="-79"/>
+              </a:rPr>
+              <a:t>מקש רווח</a:t>
             </a:r>
             <a:endParaRPr lang="he-IL" sz="1937" dirty="0">
               <a:solidFill>
@@ -3702,7 +3712,17 @@
                   <a:latin typeface="David" panose="020E0502060401010101" pitchFamily="34" charset="-79"/>
                   <a:cs typeface="David" panose="020E0502060401010101" pitchFamily="34" charset="-79"/>
                 </a:rPr>
-                <a:t>"אני עייף."</a:t>
+                <a:t>"</a:t>
+              </a:r>
+              <a:r>
+                <a:rPr lang="he-IL" dirty="0">
+                  <a:solidFill>
+                    <a:srgbClr val="FF0000"/>
+                  </a:solidFill>
+                  <a:latin typeface="David" panose="020E0502060401010101" pitchFamily="34" charset="-79"/>
+                  <a:cs typeface="David" panose="020E0502060401010101" pitchFamily="34" charset="-79"/>
+                </a:rPr>
+                <a:t>אני עייף."</a:t>
               </a:r>
             </a:p>
             <a:p>
@@ -3713,6 +3733,9 @@
               </a:pPr>
               <a:r>
                 <a:rPr lang="he-IL" sz="1800" dirty="0" smtClean="0">
+                  <a:solidFill>
+                    <a:srgbClr val="FF0000"/>
+                  </a:solidFill>
                   <a:latin typeface="David" panose="020E0502060401010101" pitchFamily="34" charset="-79"/>
                   <a:cs typeface="David" panose="020E0502060401010101" pitchFamily="34" charset="-79"/>
                 </a:rPr>
@@ -3720,12 +3743,18 @@
               </a:r>
               <a:r>
                 <a:rPr lang="he-IL" sz="1800" dirty="0">
+                  <a:solidFill>
+                    <a:srgbClr val="FF0000"/>
+                  </a:solidFill>
                   <a:latin typeface="David" panose="020E0502060401010101" pitchFamily="34" charset="-79"/>
                   <a:cs typeface="David" panose="020E0502060401010101" pitchFamily="34" charset="-79"/>
                 </a:rPr>
                 <a:t>אני עייף."</a:t>
               </a:r>
               <a:endParaRPr lang="en-US" sz="1800" dirty="0">
+                <a:solidFill>
+                  <a:srgbClr val="FF0000"/>
+                </a:solidFill>
                 <a:latin typeface="David" panose="020E0502060401010101" pitchFamily="34" charset="-79"/>
                 <a:cs typeface="David" panose="020E0502060401010101" pitchFamily="34" charset="-79"/>
               </a:endParaRPr>
@@ -3969,6 +3998,9 @@
               </a:pPr>
               <a:r>
                 <a:rPr lang="he-IL" dirty="0">
+                  <a:solidFill>
+                    <a:srgbClr val="FF0000"/>
+                  </a:solidFill>
                   <a:latin typeface="David" panose="020E0502060401010101" pitchFamily="34" charset="-79"/>
                   <a:cs typeface="David" panose="020E0502060401010101" pitchFamily="34" charset="-79"/>
                 </a:rPr>
@@ -3976,6 +4008,9 @@
               </a:r>
               <a:r>
                 <a:rPr lang="he-IL" dirty="0" smtClean="0">
+                  <a:solidFill>
+                    <a:srgbClr val="FF0000"/>
+                  </a:solidFill>
                   <a:latin typeface="David" panose="020E0502060401010101" pitchFamily="34" charset="-79"/>
                   <a:cs typeface="David" panose="020E0502060401010101" pitchFamily="34" charset="-79"/>
                 </a:rPr>
@@ -3990,6 +4025,9 @@
               </a:pPr>
               <a:r>
                 <a:rPr lang="he-IL" dirty="0">
+                  <a:solidFill>
+                    <a:srgbClr val="FF0000"/>
+                  </a:solidFill>
                   <a:latin typeface="David" panose="020E0502060401010101" pitchFamily="34" charset="-79"/>
                   <a:cs typeface="David" panose="020E0502060401010101" pitchFamily="34" charset="-79"/>
                 </a:rPr>
@@ -4052,6 +4090,30 @@
           </p:txBody>
         </p:sp>
       </p:grpSp>
+      <p:pic>
+        <p:nvPicPr>
+          <p:cNvPr id="9" name="Picture 8"/>
+          <p:cNvPicPr>
+            <a:picLocks noChangeAspect="1"/>
+          </p:cNvPicPr>
+          <p:nvPr/>
+        </p:nvPicPr>
+        <p:blipFill>
+          <a:blip r:embed="rId2"/>
+          <a:stretch>
+            <a:fillRect/>
+          </a:stretch>
+        </p:blipFill>
+        <p:spPr>
+          <a:xfrm>
+            <a:off x="5280291" y="2440779"/>
+            <a:ext cx="1727289" cy="596931"/>
+          </a:xfrm>
+          <a:prstGeom prst="rect">
+            <a:avLst/>
+          </a:prstGeom>
+        </p:spPr>
+      </p:pic>
     </p:spTree>
     <p:extLst>
       <p:ext uri="{BB962C8B-B14F-4D97-AF65-F5344CB8AC3E}">
@@ -4145,7 +4207,7 @@
                 <a:spcPct val="150000"/>
               </a:lnSpc>
             </a:pPr>
-            <a:endParaRPr lang="he-IL" sz="1553" dirty="0" smtClean="0">
+            <a:endParaRPr lang="he-IL" sz="2400" dirty="0" smtClean="0">
               <a:solidFill>
                 <a:schemeClr val="tx1"/>
               </a:solidFill>
@@ -4160,7 +4222,7 @@
               </a:lnSpc>
             </a:pPr>
             <a:r>
-              <a:rPr lang="he-IL" sz="1553" dirty="0" smtClean="0">
+              <a:rPr lang="he-IL" sz="2400" dirty="0" smtClean="0">
                 <a:solidFill>
                   <a:schemeClr val="tx1"/>
                 </a:solidFill>
@@ -4176,7 +4238,7 @@
                 <a:spcPct val="150000"/>
               </a:lnSpc>
             </a:pPr>
-            <a:endParaRPr lang="he-IL" sz="1553" dirty="0">
+            <a:endParaRPr lang="he-IL" sz="2400" dirty="0">
               <a:solidFill>
                 <a:schemeClr val="tx1"/>
               </a:solidFill>
@@ -4191,7 +4253,7 @@
               </a:lnSpc>
             </a:pPr>
             <a:r>
-              <a:rPr lang="he-IL" sz="1553" dirty="0" smtClean="0">
+              <a:rPr lang="he-IL" sz="2400" dirty="0" smtClean="0">
                 <a:solidFill>
                   <a:schemeClr val="tx1"/>
                 </a:solidFill>
@@ -4201,7 +4263,7 @@
               <a:t>כאשר זיהית חזרה על אותו משפט, </a:t>
             </a:r>
             <a:r>
-              <a:rPr lang="he-IL" sz="1553" b="1" dirty="0" smtClean="0">
+              <a:rPr lang="he-IL" sz="2400" b="1" dirty="0" smtClean="0">
                 <a:solidFill>
                   <a:schemeClr val="tx1"/>
                 </a:solidFill>
@@ -4211,7 +4273,7 @@
               <a:t>לחץ/י על כפתור ימין או שמאל בהתאם לצד בו שמעת את המשפט שחזר על עצמו פעמיים ברצף</a:t>
             </a:r>
             <a:r>
-              <a:rPr lang="he-IL" sz="1553" dirty="0" smtClean="0">
+              <a:rPr lang="he-IL" sz="2400" dirty="0" smtClean="0">
                 <a:solidFill>
                   <a:schemeClr val="tx1"/>
                 </a:solidFill>
@@ -4227,7 +4289,7 @@
                 <a:spcPct val="150000"/>
               </a:lnSpc>
             </a:pPr>
-            <a:endParaRPr lang="he-IL" sz="1553" dirty="0" smtClean="0">
+            <a:endParaRPr lang="he-IL" sz="2400" dirty="0" smtClean="0">
               <a:solidFill>
                 <a:schemeClr val="tx1"/>
               </a:solidFill>
@@ -4241,7 +4303,7 @@
                 <a:spcPct val="150000"/>
               </a:lnSpc>
             </a:pPr>
-            <a:endParaRPr lang="he-IL" sz="1553" dirty="0">
+            <a:endParaRPr lang="he-IL" sz="2400" dirty="0">
               <a:solidFill>
                 <a:schemeClr val="tx1"/>
               </a:solidFill>
@@ -4255,7 +4317,7 @@
                 <a:spcPct val="150000"/>
               </a:lnSpc>
             </a:pPr>
-            <a:endParaRPr lang="he-IL" sz="1553" dirty="0" smtClean="0">
+            <a:endParaRPr lang="he-IL" sz="2400" dirty="0" smtClean="0">
               <a:solidFill>
                 <a:schemeClr val="tx1"/>
               </a:solidFill>
@@ -4269,7 +4331,7 @@
                 <a:spcPct val="150000"/>
               </a:lnSpc>
             </a:pPr>
-            <a:endParaRPr lang="he-IL" sz="1553" dirty="0">
+            <a:endParaRPr lang="he-IL" sz="2400" dirty="0">
               <a:solidFill>
                 <a:schemeClr val="tx1"/>
               </a:solidFill>
@@ -4283,7 +4345,7 @@
                 <a:spcPct val="150000"/>
               </a:lnSpc>
             </a:pPr>
-            <a:endParaRPr lang="he-IL" sz="1553" dirty="0" smtClean="0">
+            <a:endParaRPr lang="he-IL" sz="2400" dirty="0" smtClean="0">
               <a:solidFill>
                 <a:schemeClr val="tx1"/>
               </a:solidFill>
@@ -4297,7 +4359,7 @@
                 <a:spcPct val="150000"/>
               </a:lnSpc>
             </a:pPr>
-            <a:endParaRPr lang="he-IL" sz="1553" dirty="0">
+            <a:endParaRPr lang="he-IL" sz="2400" dirty="0">
               <a:solidFill>
                 <a:schemeClr val="tx1"/>
               </a:solidFill>
@@ -4311,7 +4373,7 @@
                 <a:spcPct val="150000"/>
               </a:lnSpc>
             </a:pPr>
-            <a:endParaRPr lang="he-IL" sz="1553" dirty="0" smtClean="0">
+            <a:endParaRPr lang="he-IL" sz="2400" dirty="0" smtClean="0">
               <a:solidFill>
                 <a:schemeClr val="tx1"/>
               </a:solidFill>
@@ -4325,7 +4387,7 @@
                 <a:spcPct val="150000"/>
               </a:lnSpc>
             </a:pPr>
-            <a:endParaRPr lang="he-IL" sz="1553" dirty="0">
+            <a:endParaRPr lang="he-IL" sz="2400" dirty="0">
               <a:solidFill>
                 <a:schemeClr val="tx1"/>
               </a:solidFill>
@@ -4399,6 +4461,16 @@
           <a:p>
             <a:pPr algn="ctr" rtl="1"/>
             <a:r>
+              <a:rPr lang="he-IL" sz="1937" u="sng" dirty="0" smtClean="0">
+                <a:solidFill>
+                  <a:schemeClr val="tx1"/>
+                </a:solidFill>
+                <a:latin typeface="David" panose="020E0502060401010101" pitchFamily="34" charset="-79"/>
+                <a:cs typeface="David" panose="020E0502060401010101" pitchFamily="34" charset="-79"/>
+              </a:rPr>
+              <a:t> לחץ/י </a:t>
+            </a:r>
+            <a:r>
               <a:rPr lang="he-IL" sz="1937" u="sng" dirty="0">
                 <a:solidFill>
                   <a:schemeClr val="tx1"/>
@@ -4406,7 +4478,7 @@
                 <a:latin typeface="David" panose="020E0502060401010101" pitchFamily="34" charset="-79"/>
                 <a:cs typeface="David" panose="020E0502060401010101" pitchFamily="34" charset="-79"/>
               </a:rPr>
-              <a:t> </a:t>
+              <a:t>על מקש </a:t>
             </a:r>
             <a:r>
               <a:rPr lang="he-IL" sz="1937" u="sng" dirty="0" smtClean="0">
@@ -4416,37 +4488,7 @@
                 <a:latin typeface="David" panose="020E0502060401010101" pitchFamily="34" charset="-79"/>
                 <a:cs typeface="David" panose="020E0502060401010101" pitchFamily="34" charset="-79"/>
               </a:rPr>
-              <a:t>לחץ</a:t>
-            </a:r>
-            <a:r>
-              <a:rPr lang="he-IL" sz="1937" u="sng" dirty="0">
-                <a:solidFill>
-                  <a:schemeClr val="tx1"/>
-                </a:solidFill>
-                <a:latin typeface="David" panose="020E0502060401010101" pitchFamily="34" charset="-79"/>
-                <a:cs typeface="David" panose="020E0502060401010101" pitchFamily="34" charset="-79"/>
-              </a:rPr>
-              <a:t>/י</a:t>
-            </a:r>
-            <a:r>
-              <a:rPr lang="he-IL" sz="1937" u="sng" dirty="0" smtClean="0">
-                <a:solidFill>
-                  <a:schemeClr val="tx1"/>
-                </a:solidFill>
-                <a:latin typeface="David" panose="020E0502060401010101" pitchFamily="34" charset="-79"/>
-                <a:cs typeface="David" panose="020E0502060401010101" pitchFamily="34" charset="-79"/>
-              </a:rPr>
-              <a:t> </a:t>
-            </a:r>
-            <a:r>
-              <a:rPr lang="he-IL" sz="1937" u="sng" dirty="0">
-                <a:solidFill>
-                  <a:schemeClr val="tx1"/>
-                </a:solidFill>
-                <a:latin typeface="David" panose="020E0502060401010101" pitchFamily="34" charset="-79"/>
-                <a:cs typeface="David" panose="020E0502060401010101" pitchFamily="34" charset="-79"/>
-              </a:rPr>
-              <a:t>על אחד הכפתורים</a:t>
+              <a:t>רווח</a:t>
             </a:r>
             <a:endParaRPr lang="he-IL" sz="1937" dirty="0">
               <a:solidFill>
@@ -4551,7 +4593,7 @@
                 <a:spcPct val="150000"/>
               </a:lnSpc>
             </a:pPr>
-            <a:endParaRPr lang="he-IL" sz="1553" dirty="0" smtClean="0">
+            <a:endParaRPr lang="he-IL" sz="2400" dirty="0" smtClean="0">
               <a:solidFill>
                 <a:schemeClr val="tx1"/>
               </a:solidFill>
@@ -4566,7 +4608,7 @@
               </a:lnSpc>
             </a:pPr>
             <a:r>
-              <a:rPr lang="he-IL" sz="1553" dirty="0" smtClean="0">
+              <a:rPr lang="he-IL" sz="2400" dirty="0" smtClean="0">
                 <a:solidFill>
                   <a:schemeClr val="tx1"/>
                 </a:solidFill>
@@ -4582,7 +4624,7 @@
                 <a:spcPct val="150000"/>
               </a:lnSpc>
             </a:pPr>
-            <a:endParaRPr lang="he-IL" sz="1553" dirty="0">
+            <a:endParaRPr lang="he-IL" sz="2400" dirty="0">
               <a:solidFill>
                 <a:schemeClr val="tx1"/>
               </a:solidFill>
@@ -4597,7 +4639,7 @@
               </a:lnSpc>
             </a:pPr>
             <a:r>
-              <a:rPr lang="he-IL" sz="1553" dirty="0" smtClean="0">
+              <a:rPr lang="he-IL" sz="2400" dirty="0" smtClean="0">
                 <a:solidFill>
                   <a:schemeClr val="tx1"/>
                 </a:solidFill>
@@ -4607,7 +4649,7 @@
               <a:t>כאשר זיהית חזרה על אותו משפט, </a:t>
             </a:r>
             <a:r>
-              <a:rPr lang="he-IL" sz="1553" b="1" dirty="0" smtClean="0">
+              <a:rPr lang="he-IL" sz="2400" b="1" dirty="0" smtClean="0">
                 <a:solidFill>
                   <a:schemeClr val="tx1"/>
                 </a:solidFill>
@@ -4617,7 +4659,7 @@
               <a:t>לחץ/י על כפתור ימין או שמאל בהתאם לצד בו שמעת את המשפט שחזר על עצמו פעמיים ברצף</a:t>
             </a:r>
             <a:r>
-              <a:rPr lang="he-IL" sz="1553" dirty="0" smtClean="0">
+              <a:rPr lang="he-IL" sz="2400" dirty="0" smtClean="0">
                 <a:solidFill>
                   <a:schemeClr val="tx1"/>
                 </a:solidFill>
@@ -4633,7 +4675,7 @@
                 <a:spcPct val="150000"/>
               </a:lnSpc>
             </a:pPr>
-            <a:endParaRPr lang="he-IL" sz="1553" dirty="0" smtClean="0">
+            <a:endParaRPr lang="he-IL" sz="2400" dirty="0" smtClean="0">
               <a:solidFill>
                 <a:schemeClr val="tx1"/>
               </a:solidFill>
@@ -4647,7 +4689,7 @@
                 <a:spcPct val="150000"/>
               </a:lnSpc>
             </a:pPr>
-            <a:endParaRPr lang="he-IL" sz="1553" dirty="0">
+            <a:endParaRPr lang="he-IL" sz="2400" dirty="0">
               <a:solidFill>
                 <a:schemeClr val="tx1"/>
               </a:solidFill>
@@ -4661,7 +4703,7 @@
                 <a:spcPct val="150000"/>
               </a:lnSpc>
             </a:pPr>
-            <a:endParaRPr lang="he-IL" sz="1553" dirty="0" smtClean="0">
+            <a:endParaRPr lang="he-IL" sz="2400" dirty="0" smtClean="0">
               <a:solidFill>
                 <a:schemeClr val="tx1"/>
               </a:solidFill>
@@ -4675,7 +4717,7 @@
                 <a:spcPct val="150000"/>
               </a:lnSpc>
             </a:pPr>
-            <a:endParaRPr lang="he-IL" sz="1553" dirty="0">
+            <a:endParaRPr lang="he-IL" sz="2400" dirty="0">
               <a:solidFill>
                 <a:schemeClr val="tx1"/>
               </a:solidFill>
@@ -4689,7 +4731,7 @@
                 <a:spcPct val="150000"/>
               </a:lnSpc>
             </a:pPr>
-            <a:endParaRPr lang="he-IL" sz="1553" dirty="0" smtClean="0">
+            <a:endParaRPr lang="he-IL" sz="2400" dirty="0" smtClean="0">
               <a:solidFill>
                 <a:schemeClr val="tx1"/>
               </a:solidFill>
@@ -4703,7 +4745,7 @@
                 <a:spcPct val="150000"/>
               </a:lnSpc>
             </a:pPr>
-            <a:endParaRPr lang="he-IL" sz="1553" dirty="0">
+            <a:endParaRPr lang="he-IL" sz="2400" dirty="0">
               <a:solidFill>
                 <a:schemeClr val="tx1"/>
               </a:solidFill>
@@ -4717,7 +4759,7 @@
                 <a:spcPct val="150000"/>
               </a:lnSpc>
             </a:pPr>
-            <a:endParaRPr lang="he-IL" sz="1553" dirty="0" smtClean="0">
+            <a:endParaRPr lang="he-IL" sz="2400" dirty="0" smtClean="0">
               <a:solidFill>
                 <a:schemeClr val="tx1"/>
               </a:solidFill>
@@ -4731,7 +4773,7 @@
                 <a:spcPct val="150000"/>
               </a:lnSpc>
             </a:pPr>
-            <a:endParaRPr lang="he-IL" sz="1553" dirty="0">
+            <a:endParaRPr lang="he-IL" sz="2400" dirty="0">
               <a:solidFill>
                 <a:schemeClr val="tx1"/>
               </a:solidFill>
@@ -4852,7 +4894,17 @@
                 <a:latin typeface="David" panose="020E0502060401010101" pitchFamily="34" charset="-79"/>
                 <a:cs typeface="David" panose="020E0502060401010101" pitchFamily="34" charset="-79"/>
               </a:rPr>
-              <a:t>על אחד הכפתורים</a:t>
+              <a:t>על </a:t>
+            </a:r>
+            <a:r>
+              <a:rPr lang="he-IL" sz="1937" u="sng" dirty="0">
+                <a:solidFill>
+                  <a:schemeClr val="tx1"/>
+                </a:solidFill>
+                <a:latin typeface="David" panose="020E0502060401010101" pitchFamily="34" charset="-79"/>
+                <a:cs typeface="David" panose="020E0502060401010101" pitchFamily="34" charset="-79"/>
+              </a:rPr>
+              <a:t>מקש רווח</a:t>
             </a:r>
             <a:endParaRPr lang="he-IL" sz="1937" dirty="0">
               <a:solidFill>
@@ -4957,7 +5009,7 @@
                 <a:spcPct val="150000"/>
               </a:lnSpc>
             </a:pPr>
-            <a:endParaRPr lang="he-IL" sz="1553" dirty="0" smtClean="0">
+            <a:endParaRPr lang="he-IL" sz="2400" dirty="0" smtClean="0">
               <a:solidFill>
                 <a:schemeClr val="tx1"/>
               </a:solidFill>
@@ -4972,34 +5024,14 @@
               </a:lnSpc>
             </a:pPr>
             <a:r>
-              <a:rPr lang="he-IL" sz="1553" dirty="0" smtClean="0">
-                <a:solidFill>
-                  <a:schemeClr val="tx1"/>
-                </a:solidFill>
-                <a:latin typeface="David" panose="020E0502060401010101" pitchFamily="34" charset="-79"/>
-                <a:cs typeface="David" panose="020E0502060401010101" pitchFamily="34" charset="-79"/>
-              </a:rPr>
-              <a:t>הסתיים </a:t>
-            </a:r>
-            <a:r>
-              <a:rPr lang="he-IL" sz="1553" dirty="0" smtClean="0">
-                <a:solidFill>
-                  <a:schemeClr val="tx1"/>
-                </a:solidFill>
-                <a:latin typeface="David" panose="020E0502060401010101" pitchFamily="34" charset="-79"/>
-                <a:cs typeface="David" panose="020E0502060401010101" pitchFamily="34" charset="-79"/>
-              </a:rPr>
-              <a:t>האימון</a:t>
-            </a:r>
-            <a:r>
-              <a:rPr lang="he-IL" sz="1553" dirty="0" smtClean="0">
-                <a:solidFill>
-                  <a:schemeClr val="tx1"/>
-                </a:solidFill>
-                <a:latin typeface="David" panose="020E0502060401010101" pitchFamily="34" charset="-79"/>
-                <a:cs typeface="David" panose="020E0502060401010101" pitchFamily="34" charset="-79"/>
-              </a:rPr>
-              <a:t>, כעת נתחיל במטלה.</a:t>
+              <a:rPr lang="he-IL" sz="2400" dirty="0" smtClean="0">
+                <a:solidFill>
+                  <a:schemeClr val="tx1"/>
+                </a:solidFill>
+                <a:latin typeface="David" panose="020E0502060401010101" pitchFamily="34" charset="-79"/>
+                <a:cs typeface="David" panose="020E0502060401010101" pitchFamily="34" charset="-79"/>
+              </a:rPr>
+              <a:t>הסתיים האימון, כעת נתחיל במטלה.</a:t>
             </a:r>
           </a:p>
           <a:p>
@@ -5008,7 +5040,7 @@
                 <a:spcPct val="150000"/>
               </a:lnSpc>
             </a:pPr>
-            <a:endParaRPr lang="he-IL" sz="1553" dirty="0">
+            <a:endParaRPr lang="he-IL" sz="2400" dirty="0">
               <a:solidFill>
                 <a:schemeClr val="tx1"/>
               </a:solidFill>
@@ -5023,17 +5055,27 @@
               </a:lnSpc>
             </a:pPr>
             <a:r>
-              <a:rPr lang="he-IL" sz="1553" dirty="0" smtClean="0">
-                <a:solidFill>
-                  <a:schemeClr val="tx1"/>
-                </a:solidFill>
-                <a:latin typeface="David" panose="020E0502060401010101" pitchFamily="34" charset="-79"/>
-                <a:cs typeface="David" panose="020E0502060401010101" pitchFamily="34" charset="-79"/>
-              </a:rPr>
-              <a:t>להזכיר, כאשר זיהית חזרה על אותו משפט, </a:t>
-            </a:r>
-            <a:r>
-              <a:rPr lang="he-IL" sz="1553" b="1" dirty="0" smtClean="0">
+              <a:rPr lang="he-IL" sz="2400" dirty="0" smtClean="0">
+                <a:solidFill>
+                  <a:schemeClr val="tx1"/>
+                </a:solidFill>
+                <a:latin typeface="David" panose="020E0502060401010101" pitchFamily="34" charset="-79"/>
+                <a:cs typeface="David" panose="020E0502060401010101" pitchFamily="34" charset="-79"/>
+              </a:rPr>
+              <a:t>כאשר </a:t>
+            </a:r>
+            <a:r>
+              <a:rPr lang="he-IL" sz="2400" dirty="0" smtClean="0">
+                <a:solidFill>
+                  <a:schemeClr val="tx1"/>
+                </a:solidFill>
+                <a:latin typeface="David" panose="020E0502060401010101" pitchFamily="34" charset="-79"/>
+                <a:cs typeface="David" panose="020E0502060401010101" pitchFamily="34" charset="-79"/>
+              </a:rPr>
+              <a:t>זיהית חזרה על אותו משפט, </a:t>
+            </a:r>
+            <a:r>
+              <a:rPr lang="he-IL" sz="2400" b="1" dirty="0" smtClean="0">
                 <a:solidFill>
                   <a:schemeClr val="tx1"/>
                 </a:solidFill>
@@ -5043,7 +5085,7 @@
               <a:t>לחץ/י על כפתור ימין או שמאל בהתאם לצד בו שמעת את המשפט שחזר על עצמו פעמיים ברצף</a:t>
             </a:r>
             <a:r>
-              <a:rPr lang="he-IL" sz="1553" dirty="0" smtClean="0">
+              <a:rPr lang="he-IL" sz="2400" dirty="0" smtClean="0">
                 <a:solidFill>
                   <a:schemeClr val="tx1"/>
                 </a:solidFill>
@@ -5059,7 +5101,7 @@
                 <a:spcPct val="150000"/>
               </a:lnSpc>
             </a:pPr>
-            <a:endParaRPr lang="he-IL" sz="1553" dirty="0">
+            <a:endParaRPr lang="he-IL" sz="2400" dirty="0">
               <a:solidFill>
                 <a:schemeClr val="tx1"/>
               </a:solidFill>
@@ -5074,7 +5116,7 @@
               </a:lnSpc>
             </a:pPr>
             <a:r>
-              <a:rPr lang="he-IL" sz="1553" dirty="0" smtClean="0">
+              <a:rPr lang="he-IL" sz="2400" dirty="0" smtClean="0">
                 <a:solidFill>
                   <a:schemeClr val="tx1"/>
                 </a:solidFill>
@@ -5090,7 +5132,7 @@
                 <a:spcPct val="150000"/>
               </a:lnSpc>
             </a:pPr>
-            <a:endParaRPr lang="he-IL" sz="1553" dirty="0" smtClean="0">
+            <a:endParaRPr lang="he-IL" sz="2400" dirty="0" smtClean="0">
               <a:solidFill>
                 <a:schemeClr val="tx1"/>
               </a:solidFill>
@@ -5104,7 +5146,7 @@
                 <a:spcPct val="150000"/>
               </a:lnSpc>
             </a:pPr>
-            <a:endParaRPr lang="he-IL" sz="1553" dirty="0">
+            <a:endParaRPr lang="he-IL" sz="2400" dirty="0">
               <a:solidFill>
                 <a:schemeClr val="tx1"/>
               </a:solidFill>
@@ -5118,7 +5160,7 @@
                 <a:spcPct val="150000"/>
               </a:lnSpc>
             </a:pPr>
-            <a:endParaRPr lang="he-IL" sz="1553" dirty="0" smtClean="0">
+            <a:endParaRPr lang="he-IL" sz="2400" dirty="0" smtClean="0">
               <a:solidFill>
                 <a:schemeClr val="tx1"/>
               </a:solidFill>
@@ -5132,7 +5174,7 @@
                 <a:spcPct val="150000"/>
               </a:lnSpc>
             </a:pPr>
-            <a:endParaRPr lang="he-IL" sz="1553" dirty="0">
+            <a:endParaRPr lang="he-IL" sz="2400" dirty="0">
               <a:solidFill>
                 <a:schemeClr val="tx1"/>
               </a:solidFill>
@@ -5146,7 +5188,7 @@
                 <a:spcPct val="150000"/>
               </a:lnSpc>
             </a:pPr>
-            <a:endParaRPr lang="he-IL" sz="1553" dirty="0" smtClean="0">
+            <a:endParaRPr lang="he-IL" sz="2400" dirty="0" smtClean="0">
               <a:solidFill>
                 <a:schemeClr val="tx1"/>
               </a:solidFill>
@@ -5160,7 +5202,7 @@
                 <a:spcPct val="150000"/>
               </a:lnSpc>
             </a:pPr>
-            <a:endParaRPr lang="he-IL" sz="1553" dirty="0">
+            <a:endParaRPr lang="he-IL" sz="2400" dirty="0">
               <a:solidFill>
                 <a:schemeClr val="tx1"/>
               </a:solidFill>
@@ -5174,7 +5216,7 @@
                 <a:spcPct val="150000"/>
               </a:lnSpc>
             </a:pPr>
-            <a:endParaRPr lang="he-IL" sz="1553" dirty="0" smtClean="0">
+            <a:endParaRPr lang="he-IL" sz="2400" dirty="0" smtClean="0">
               <a:solidFill>
                 <a:schemeClr val="tx1"/>
               </a:solidFill>
@@ -5188,7 +5230,7 @@
                 <a:spcPct val="150000"/>
               </a:lnSpc>
             </a:pPr>
-            <a:endParaRPr lang="he-IL" sz="1553" dirty="0">
+            <a:endParaRPr lang="he-IL" sz="2400" dirty="0">
               <a:solidFill>
                 <a:schemeClr val="tx1"/>
               </a:solidFill>
@@ -5289,7 +5331,17 @@
                 <a:latin typeface="David" panose="020E0502060401010101" pitchFamily="34" charset="-79"/>
                 <a:cs typeface="David" panose="020E0502060401010101" pitchFamily="34" charset="-79"/>
               </a:rPr>
-              <a:t>על אחד הכפתורים</a:t>
+              <a:t>על </a:t>
+            </a:r>
+            <a:r>
+              <a:rPr lang="he-IL" sz="1937" u="sng" dirty="0">
+                <a:solidFill>
+                  <a:schemeClr val="tx1"/>
+                </a:solidFill>
+                <a:latin typeface="David" panose="020E0502060401010101" pitchFamily="34" charset="-79"/>
+                <a:cs typeface="David" panose="020E0502060401010101" pitchFamily="34" charset="-79"/>
+              </a:rPr>
+              <a:t>מקש רווח</a:t>
             </a:r>
             <a:endParaRPr lang="he-IL" sz="1937" dirty="0">
               <a:solidFill>
@@ -5552,27 +5604,7 @@
                 <a:latin typeface="David" panose="020E0502060401010101" pitchFamily="34" charset="-79"/>
                 <a:cs typeface="David" panose="020E0502060401010101" pitchFamily="34" charset="-79"/>
               </a:rPr>
-              <a:t>כאשר את/ה מוכן/ה להמשיך במטלה</a:t>
-            </a:r>
-            <a:r>
-              <a:rPr lang="he-IL" sz="2400" smtClean="0">
-                <a:solidFill>
-                  <a:schemeClr val="tx1"/>
-                </a:solidFill>
-                <a:latin typeface="David" panose="020E0502060401010101" pitchFamily="34" charset="-79"/>
-                <a:cs typeface="David" panose="020E0502060401010101" pitchFamily="34" charset="-79"/>
-              </a:rPr>
-              <a:t>, לחץ/י </a:t>
-            </a:r>
-            <a:r>
-              <a:rPr lang="he-IL" sz="2400" dirty="0" smtClean="0">
-                <a:solidFill>
-                  <a:schemeClr val="tx1"/>
-                </a:solidFill>
-                <a:latin typeface="David" panose="020E0502060401010101" pitchFamily="34" charset="-79"/>
-                <a:cs typeface="David" panose="020E0502060401010101" pitchFamily="34" charset="-79"/>
-              </a:rPr>
-              <a:t>על אחד הכפתורים.</a:t>
+              <a:t>כאשר את/ה מוכן/ה להמשיך במטלה, לחץ/י על אחד הכפתורים.</a:t>
             </a:r>
           </a:p>
           <a:p>
@@ -5734,7 +5766,17 @@
                 <a:latin typeface="David" panose="020E0502060401010101" pitchFamily="34" charset="-79"/>
                 <a:cs typeface="David" panose="020E0502060401010101" pitchFamily="34" charset="-79"/>
               </a:rPr>
-              <a:t>על אחד הכפתורים</a:t>
+              <a:t>על </a:t>
+            </a:r>
+            <a:r>
+              <a:rPr lang="he-IL" sz="1937" u="sng" dirty="0">
+                <a:solidFill>
+                  <a:schemeClr val="tx1"/>
+                </a:solidFill>
+                <a:latin typeface="David" panose="020E0502060401010101" pitchFamily="34" charset="-79"/>
+                <a:cs typeface="David" panose="020E0502060401010101" pitchFamily="34" charset="-79"/>
+              </a:rPr>
+              <a:t>מקש רווח</a:t>
             </a:r>
             <a:endParaRPr lang="he-IL" sz="1937" dirty="0">
               <a:solidFill>
@@ -6009,7 +6051,17 @@
                 <a:latin typeface="David" panose="020E0502060401010101" pitchFamily="34" charset="-79"/>
                 <a:cs typeface="David" panose="020E0502060401010101" pitchFamily="34" charset="-79"/>
               </a:rPr>
-              <a:t>על אחד הכפתורים</a:t>
+              <a:t>על </a:t>
+            </a:r>
+            <a:r>
+              <a:rPr lang="he-IL" sz="1937" u="sng" dirty="0">
+                <a:solidFill>
+                  <a:schemeClr val="tx1"/>
+                </a:solidFill>
+                <a:latin typeface="David" panose="020E0502060401010101" pitchFamily="34" charset="-79"/>
+                <a:cs typeface="David" panose="020E0502060401010101" pitchFamily="34" charset="-79"/>
+              </a:rPr>
+              <a:t>מקש רווח</a:t>
             </a:r>
             <a:endParaRPr lang="he-IL" sz="1937" dirty="0">
               <a:solidFill>

</xml_diff>